<commit_message>
Finished up poster design
</commit_message>
<xml_diff>
--- a/posters/sni_2015.pptx
+++ b/posters/sni_2015.pptx
@@ -3095,73 +3095,69 @@
           <a:chExt cx="0" cy="0"/>
         </a:xfrm>
       </p:grpSpPr>
-      <p:sp>
-        <p:nvSpPr>
-          <p:cNvPr id="4" name="Rounded Rectangle 3"/>
+      <p:pic>
+        <p:nvPicPr>
+          <p:cNvPr id="1030" name="Picture 6" descr="http://gru.stanford.edu/lib/exe/fetch.php/shared/efficientselection.png?w=725&amp;h=195&amp;cache=cache"/>
+          <p:cNvPicPr>
+            <a:picLocks noChangeAspect="1" noChangeArrowheads="1"/>
+          </p:cNvPicPr>
+          <p:nvPr/>
+        </p:nvPicPr>
+        <p:blipFill>
+          <a:blip r:embed="rId2">
+            <a:extLst>
+              <a:ext uri="{28A0092B-C50C-407E-A947-70E740481C1C}">
+                <a14:useLocalDpi xmlns:a14="http://schemas.microsoft.com/office/drawing/2010/main" val="0"/>
+              </a:ext>
+            </a:extLst>
+          </a:blip>
+          <a:srcRect/>
+          <a:stretch>
+            <a:fillRect/>
+          </a:stretch>
+        </p:blipFill>
+        <p:spPr bwMode="auto">
+          <a:xfrm>
+            <a:off x="27965400" y="7447548"/>
+            <a:ext cx="32847262" cy="8814948"/>
+          </a:xfrm>
+          <a:prstGeom prst="rect">
+            <a:avLst/>
+          </a:prstGeom>
+          <a:noFill/>
+          <a:extLst>
+            <a:ext uri="{909E8E84-426E-40DD-AFC4-6F175D3DCCD1}">
+              <a14:hiddenFill xmlns:a14="http://schemas.microsoft.com/office/drawing/2010/main">
+                <a:solidFill>
+                  <a:srgbClr val="FFFFFF"/>
+                </a:solidFill>
+              </a14:hiddenFill>
+            </a:ext>
+          </a:extLst>
+        </p:spPr>
+      </p:pic>
+      <p:sp>
+        <p:nvSpPr>
+          <p:cNvPr id="61" name="Rectangle 60"/>
           <p:cNvSpPr/>
           <p:nvPr/>
         </p:nvSpPr>
         <p:spPr>
           <a:xfrm>
-            <a:off x="228600" y="228600"/>
-            <a:ext cx="37947600" cy="32461200"/>
-          </a:xfrm>
-          <a:prstGeom prst="roundRect">
-            <a:avLst>
-              <a:gd name="adj" fmla="val 4488"/>
-            </a:avLst>
-          </a:prstGeom>
-          <a:ln>
-            <a:solidFill>
-              <a:schemeClr val="bg1">
-                <a:lumMod val="65000"/>
-              </a:schemeClr>
-            </a:solidFill>
-          </a:ln>
-        </p:spPr>
-        <p:style>
-          <a:lnRef idx="2">
-            <a:schemeClr val="dk1"/>
-          </a:lnRef>
-          <a:fillRef idx="1">
-            <a:schemeClr val="lt1"/>
-          </a:fillRef>
-          <a:effectRef idx="0">
-            <a:schemeClr val="dk1"/>
-          </a:effectRef>
-          <a:fontRef idx="minor">
-            <a:schemeClr val="dk1"/>
-          </a:fontRef>
-        </p:style>
-        <p:txBody>
-          <a:bodyPr rtlCol="0" anchor="ctr"/>
-          <a:lstStyle/>
-          <a:p>
-            <a:pPr algn="ctr"/>
-            <a:endParaRPr lang="en-US" dirty="0">
-              <a:latin typeface="Microsoft Sans Serif" pitchFamily="34" charset="0"/>
-              <a:cs typeface="Microsoft Sans Serif" pitchFamily="34" charset="0"/>
-            </a:endParaRPr>
-          </a:p>
-        </p:txBody>
-      </p:sp>
-      <p:sp>
-        <p:nvSpPr>
-          <p:cNvPr id="5" name="Rectangle 4"/>
-          <p:cNvSpPr/>
-          <p:nvPr/>
-        </p:nvSpPr>
-        <p:spPr>
-          <a:xfrm>
-            <a:off x="1524000" y="952500"/>
-            <a:ext cx="35356800" cy="3524250"/>
+            <a:off x="35700569" y="7262278"/>
+            <a:ext cx="13448431" cy="8587323"/>
           </a:xfrm>
           <a:prstGeom prst="rect">
             <a:avLst/>
           </a:prstGeom>
           <a:solidFill>
-            <a:srgbClr val="8C1515"/>
+            <a:schemeClr val="bg1"/>
           </a:solidFill>
+          <a:ln>
+            <a:solidFill>
+              <a:schemeClr val="bg1"/>
+            </a:solidFill>
+          </a:ln>
         </p:spPr>
         <p:style>
           <a:lnRef idx="2">
@@ -3184,9 +3180,103 @@
           <a:lstStyle/>
           <a:p>
             <a:pPr algn="ctr"/>
+            <a:endParaRPr lang="en-US"/>
+          </a:p>
+        </p:txBody>
+      </p:sp>
+      <p:sp>
+        <p:nvSpPr>
+          <p:cNvPr id="4" name="Rounded Rectangle 3"/>
+          <p:cNvSpPr/>
+          <p:nvPr/>
+        </p:nvSpPr>
+        <p:spPr>
+          <a:xfrm>
+            <a:off x="228600" y="228600"/>
+            <a:ext cx="37947600" cy="32461200"/>
+          </a:xfrm>
+          <a:prstGeom prst="roundRect">
+            <a:avLst>
+              <a:gd name="adj" fmla="val 4488"/>
+            </a:avLst>
+          </a:prstGeom>
+          <a:noFill/>
+          <a:ln>
+            <a:solidFill>
+              <a:schemeClr val="bg1">
+                <a:lumMod val="65000"/>
+              </a:schemeClr>
+            </a:solidFill>
+          </a:ln>
+        </p:spPr>
+        <p:style>
+          <a:lnRef idx="2">
+            <a:schemeClr val="dk1"/>
+          </a:lnRef>
+          <a:fillRef idx="1">
+            <a:schemeClr val="lt1"/>
+          </a:fillRef>
+          <a:effectRef idx="0">
+            <a:schemeClr val="dk1"/>
+          </a:effectRef>
+          <a:fontRef idx="minor">
+            <a:schemeClr val="dk1"/>
+          </a:fontRef>
+        </p:style>
+        <p:txBody>
+          <a:bodyPr rtlCol="0" anchor="ctr"/>
+          <a:lstStyle/>
+          <a:p>
+            <a:pPr algn="ctr"/>
+            <a:endParaRPr lang="en-US" dirty="0">
+              <a:latin typeface="Gill Sans MT" pitchFamily="34" charset="0"/>
+              <a:cs typeface="Microsoft Sans Serif" pitchFamily="34" charset="0"/>
+            </a:endParaRPr>
+          </a:p>
+        </p:txBody>
+      </p:sp>
+      <p:sp>
+        <p:nvSpPr>
+          <p:cNvPr id="5" name="Rectangle 4"/>
+          <p:cNvSpPr/>
+          <p:nvPr/>
+        </p:nvSpPr>
+        <p:spPr>
+          <a:xfrm>
+            <a:off x="1524000" y="952500"/>
+            <a:ext cx="35356800" cy="3524250"/>
+          </a:xfrm>
+          <a:prstGeom prst="rect">
+            <a:avLst/>
+          </a:prstGeom>
+          <a:solidFill>
+            <a:srgbClr val="8C1515"/>
+          </a:solidFill>
+        </p:spPr>
+        <p:style>
+          <a:lnRef idx="2">
+            <a:schemeClr val="accent1">
+              <a:shade val="50000"/>
+            </a:schemeClr>
+          </a:lnRef>
+          <a:fillRef idx="1">
+            <a:schemeClr val="accent1"/>
+          </a:fillRef>
+          <a:effectRef idx="0">
+            <a:schemeClr val="accent1"/>
+          </a:effectRef>
+          <a:fontRef idx="minor">
+            <a:schemeClr val="lt1"/>
+          </a:fontRef>
+        </p:style>
+        <p:txBody>
+          <a:bodyPr rtlCol="0" anchor="ctr"/>
+          <a:lstStyle/>
+          <a:p>
+            <a:pPr algn="ctr"/>
             <a:r>
               <a:rPr lang="en-US" dirty="0" smtClean="0">
-                <a:latin typeface="Microsoft Sans Serif" pitchFamily="34" charset="0"/>
+                <a:latin typeface="Gill Sans MT" pitchFamily="34" charset="0"/>
                 <a:cs typeface="Microsoft Sans Serif" pitchFamily="34" charset="0"/>
               </a:rPr>
               <a:t>Neural Substrates of Attention and Awareness</a:t>
@@ -3196,13 +3286,51 @@
             <a:pPr algn="ctr"/>
             <a:r>
               <a:rPr lang="en-US" sz="4800" dirty="0" smtClean="0">
-                <a:latin typeface="Microsoft Sans Serif" pitchFamily="34" charset="0"/>
+                <a:latin typeface="Gill Sans MT" pitchFamily="34" charset="0"/>
                 <a:cs typeface="Microsoft Sans Serif" pitchFamily="34" charset="0"/>
               </a:rPr>
-              <a:t>Asymmetrical Effects of Feature-Based Attention in Vision can be Predicted from Neural Architecture</a:t>
+              <a:t>Asymmetrical </a:t>
+            </a:r>
+            <a:r>
+              <a:rPr lang="en-US" sz="4800" dirty="0" smtClean="0">
+                <a:latin typeface="Gill Sans MT" pitchFamily="34" charset="0"/>
+                <a:cs typeface="Microsoft Sans Serif" pitchFamily="34" charset="0"/>
+              </a:rPr>
+              <a:t>Behavioral Effects </a:t>
+            </a:r>
+            <a:r>
+              <a:rPr lang="en-US" sz="4800" dirty="0" smtClean="0">
+                <a:latin typeface="Gill Sans MT" pitchFamily="34" charset="0"/>
+                <a:cs typeface="Microsoft Sans Serif" pitchFamily="34" charset="0"/>
+              </a:rPr>
+              <a:t>of Feature-Based </a:t>
+            </a:r>
+            <a:r>
+              <a:rPr lang="en-US" sz="4800" dirty="0" smtClean="0">
+                <a:latin typeface="Gill Sans MT" pitchFamily="34" charset="0"/>
+                <a:cs typeface="Microsoft Sans Serif" pitchFamily="34" charset="0"/>
+              </a:rPr>
+              <a:t>Attention</a:t>
+            </a:r>
+          </a:p>
+          <a:p>
+            <a:pPr algn="ctr"/>
+            <a:r>
+              <a:rPr lang="en-US" sz="4800" dirty="0" smtClean="0">
+                <a:latin typeface="Gill Sans MT" pitchFamily="34" charset="0"/>
+                <a:cs typeface="Microsoft Sans Serif" pitchFamily="34" charset="0"/>
+              </a:rPr>
+              <a:t>Can </a:t>
+            </a:r>
+            <a:r>
+              <a:rPr lang="en-US" sz="4800" dirty="0" smtClean="0">
+                <a:latin typeface="Gill Sans MT" pitchFamily="34" charset="0"/>
+                <a:cs typeface="Microsoft Sans Serif" pitchFamily="34" charset="0"/>
+              </a:rPr>
+              <a:t>be Predicted from Neural Architecture</a:t>
             </a:r>
             <a:endParaRPr lang="en-US" sz="4800" dirty="0">
-              <a:latin typeface="Microsoft Sans Serif" pitchFamily="34" charset="0"/>
+              <a:latin typeface="Gill Sans MT" pitchFamily="34" charset="0"/>
               <a:cs typeface="Microsoft Sans Serif" pitchFamily="34" charset="0"/>
             </a:endParaRPr>
           </a:p>
@@ -3216,8 +3344,8 @@
         </p:nvSpPr>
         <p:spPr>
           <a:xfrm>
-            <a:off x="12730917" y="4627311"/>
-            <a:ext cx="12942967" cy="2308324"/>
+            <a:off x="13139587" y="4627311"/>
+            <a:ext cx="12125627" cy="2308324"/>
           </a:xfrm>
           <a:prstGeom prst="rect">
             <a:avLst/>
@@ -3232,25 +3360,18 @@
           <a:p>
             <a:pPr algn="ctr"/>
             <a:r>
-              <a:rPr lang="en-US" sz="4800" u="sng" dirty="0" smtClean="0">
-                <a:latin typeface="Microsoft Sans Serif" pitchFamily="34" charset="0"/>
+              <a:rPr lang="en-US" sz="4800" b="1" dirty="0" smtClean="0">
+                <a:latin typeface="Gill Sans MT" pitchFamily="34" charset="0"/>
                 <a:cs typeface="Microsoft Sans Serif" pitchFamily="34" charset="0"/>
               </a:rPr>
-              <a:t>Daniel Birman</a:t>
-            </a:r>
+              <a:t>Daniel Birman, Justin Gardner</a:t>
+            </a:r>
+          </a:p>
+          <a:p>
+            <a:pPr algn="ctr"/>
             <a:r>
               <a:rPr lang="en-US" sz="4800" dirty="0" smtClean="0">
-                <a:latin typeface="Microsoft Sans Serif" pitchFamily="34" charset="0"/>
-                <a:cs typeface="Microsoft Sans Serif" pitchFamily="34" charset="0"/>
-              </a:rPr>
-              <a:t>, Justin Gardner</a:t>
-            </a:r>
-          </a:p>
-          <a:p>
-            <a:pPr algn="ctr"/>
-            <a:r>
-              <a:rPr lang="en-US" sz="4800" dirty="0" smtClean="0">
-                <a:latin typeface="Microsoft Sans Serif" pitchFamily="34" charset="0"/>
+                <a:latin typeface="Gill Sans MT" pitchFamily="34" charset="0"/>
                 <a:cs typeface="Microsoft Sans Serif" pitchFamily="34" charset="0"/>
               </a:rPr>
               <a:t>Department of Psychology, Stanford University</a:t>
@@ -3260,13 +3381,13 @@
             <a:pPr algn="ctr"/>
             <a:r>
               <a:rPr lang="en-US" sz="4800" dirty="0" smtClean="0">
-                <a:latin typeface="Microsoft Sans Serif" pitchFamily="34" charset="0"/>
+                <a:latin typeface="Gill Sans MT" pitchFamily="34" charset="0"/>
                 <a:cs typeface="Microsoft Sans Serif" pitchFamily="34" charset="0"/>
               </a:rPr>
               <a:t>dbirman@stanford.edu</a:t>
             </a:r>
             <a:endParaRPr lang="en-US" sz="4800" dirty="0">
-              <a:latin typeface="Microsoft Sans Serif" pitchFamily="34" charset="0"/>
+              <a:latin typeface="Gill Sans MT" pitchFamily="34" charset="0"/>
               <a:cs typeface="Microsoft Sans Serif" pitchFamily="34" charset="0"/>
             </a:endParaRPr>
           </a:p>
@@ -3321,7 +3442,7 @@
             <a:p>
               <a:pPr algn="ctr"/>
               <a:endParaRPr lang="en-US">
-                <a:latin typeface="Microsoft Sans Serif" pitchFamily="34" charset="0"/>
+                <a:latin typeface="Gill Sans MT" pitchFamily="34" charset="0"/>
                 <a:cs typeface="Microsoft Sans Serif" pitchFamily="34" charset="0"/>
               </a:endParaRPr>
             </a:p>
@@ -3400,8 +3521,8 @@
         </p:nvSpPr>
         <p:spPr>
           <a:xfrm>
-            <a:off x="4572000" y="5612196"/>
-            <a:ext cx="4240263" cy="1323439"/>
+            <a:off x="4433450" y="4950476"/>
+            <a:ext cx="3813032" cy="1323439"/>
           </a:xfrm>
           <a:prstGeom prst="rect">
             <a:avLst/>
@@ -3416,13 +3537,13 @@
           <a:p>
             <a:r>
               <a:rPr lang="en-US" dirty="0" smtClean="0">
-                <a:latin typeface="Microsoft Sans Serif" pitchFamily="34" charset="0"/>
+                <a:latin typeface="Gill Sans MT" pitchFamily="34" charset="0"/>
                 <a:cs typeface="Microsoft Sans Serif" pitchFamily="34" charset="0"/>
               </a:rPr>
               <a:t>Behavior</a:t>
             </a:r>
             <a:endParaRPr lang="en-US" dirty="0">
-              <a:latin typeface="Microsoft Sans Serif" pitchFamily="34" charset="0"/>
+              <a:latin typeface="Gill Sans MT" pitchFamily="34" charset="0"/>
               <a:cs typeface="Microsoft Sans Serif" pitchFamily="34" charset="0"/>
             </a:endParaRPr>
           </a:p>
@@ -3437,7 +3558,7 @@
         <p:spPr>
           <a:xfrm>
             <a:off x="3612645" y="17816780"/>
-            <a:ext cx="5652509" cy="1323439"/>
+            <a:ext cx="5384807" cy="1323439"/>
           </a:xfrm>
           <a:prstGeom prst="rect">
             <a:avLst/>
@@ -3452,13 +3573,13 @@
           <a:p>
             <a:r>
               <a:rPr lang="en-US" dirty="0" smtClean="0">
-                <a:latin typeface="Microsoft Sans Serif" pitchFamily="34" charset="0"/>
+                <a:latin typeface="Gill Sans MT" pitchFamily="34" charset="0"/>
                 <a:cs typeface="Microsoft Sans Serif" pitchFamily="34" charset="0"/>
               </a:rPr>
               <a:t>Neural Data</a:t>
             </a:r>
             <a:endParaRPr lang="en-US" dirty="0">
-              <a:latin typeface="Microsoft Sans Serif" pitchFamily="34" charset="0"/>
+              <a:latin typeface="Gill Sans MT" pitchFamily="34" charset="0"/>
               <a:cs typeface="Microsoft Sans Serif" pitchFamily="34" charset="0"/>
             </a:endParaRPr>
           </a:p>
@@ -3472,8 +3593,8 @@
         </p:nvSpPr>
         <p:spPr>
           <a:xfrm>
-            <a:off x="27602711" y="16698740"/>
-            <a:ext cx="8345554" cy="1323439"/>
+            <a:off x="26974800" y="16698740"/>
+            <a:ext cx="10251653" cy="1323439"/>
           </a:xfrm>
           <a:prstGeom prst="rect">
             <a:avLst/>
@@ -3488,49 +3609,13 @@
           <a:p>
             <a:r>
               <a:rPr lang="en-US" dirty="0" smtClean="0">
-                <a:latin typeface="Microsoft Sans Serif" pitchFamily="34" charset="0"/>
+                <a:latin typeface="Gill Sans MT" pitchFamily="34" charset="0"/>
                 <a:cs typeface="Microsoft Sans Serif" pitchFamily="34" charset="0"/>
               </a:rPr>
-              <a:t>Model Predictions</a:t>
+              <a:t>Hierarchical Explanation</a:t>
             </a:r>
             <a:endParaRPr lang="en-US" dirty="0">
-              <a:latin typeface="Microsoft Sans Serif" pitchFamily="34" charset="0"/>
-              <a:cs typeface="Microsoft Sans Serif" pitchFamily="34" charset="0"/>
-            </a:endParaRPr>
-          </a:p>
-        </p:txBody>
-      </p:sp>
-      <p:sp>
-        <p:nvSpPr>
-          <p:cNvPr id="22" name="TextBox 21"/>
-          <p:cNvSpPr txBox="1"/>
-          <p:nvPr/>
-        </p:nvSpPr>
-        <p:spPr>
-          <a:xfrm>
-            <a:off x="17193298" y="22021800"/>
-            <a:ext cx="5272597" cy="1323439"/>
-          </a:xfrm>
-          <a:prstGeom prst="rect">
-            <a:avLst/>
-          </a:prstGeom>
-          <a:noFill/>
-        </p:spPr>
-        <p:txBody>
-          <a:bodyPr wrap="none" rtlCol="0">
-            <a:spAutoFit/>
-          </a:bodyPr>
-          <a:lstStyle/>
-          <a:p>
-            <a:r>
-              <a:rPr lang="en-US" dirty="0" smtClean="0">
-                <a:latin typeface="Microsoft Sans Serif" pitchFamily="34" charset="0"/>
-                <a:cs typeface="Microsoft Sans Serif" pitchFamily="34" charset="0"/>
-              </a:rPr>
-              <a:t>Conclusion</a:t>
-            </a:r>
-            <a:endParaRPr lang="en-US" dirty="0">
-              <a:latin typeface="Microsoft Sans Serif" pitchFamily="34" charset="0"/>
+              <a:latin typeface="Gill Sans MT" pitchFamily="34" charset="0"/>
               <a:cs typeface="Microsoft Sans Serif" pitchFamily="34" charset="0"/>
             </a:endParaRPr>
           </a:p>
@@ -3574,23 +3659,51 @@
             <a:pPr algn="ctr"/>
             <a:r>
               <a:rPr lang="en-US" sz="4800" dirty="0" smtClean="0">
-                <a:latin typeface="Microsoft Sans Serif" pitchFamily="34" charset="0"/>
+                <a:latin typeface="Gill Sans MT" pitchFamily="34" charset="0"/>
                 <a:cs typeface="Microsoft Sans Serif" pitchFamily="34" charset="0"/>
               </a:rPr>
-              <a:t>Attending: Contrast</a:t>
-            </a:r>
-          </a:p>
-          <a:p>
-            <a:pPr algn="ctr"/>
-            <a:r>
-              <a:rPr lang="en-US" sz="4800" dirty="0" smtClean="0">
-                <a:latin typeface="Microsoft Sans Serif" pitchFamily="34" charset="0"/>
+              <a:t>Paying Attention to </a:t>
+            </a:r>
+            <a:r>
+              <a:rPr lang="en-US" sz="4800" b="1" dirty="0" smtClean="0">
+                <a:latin typeface="Gill Sans MT" pitchFamily="34" charset="0"/>
                 <a:cs typeface="Microsoft Sans Serif" pitchFamily="34" charset="0"/>
               </a:rPr>
-              <a:t>Response: Contrast</a:t>
-            </a:r>
+              <a:t>Contrast</a:t>
+            </a:r>
+          </a:p>
+          <a:p>
+            <a:pPr algn="ctr"/>
             <a:endParaRPr lang="en-US" sz="4800" dirty="0">
-              <a:latin typeface="Microsoft Sans Serif" pitchFamily="34" charset="0"/>
+              <a:latin typeface="Gill Sans MT" pitchFamily="34" charset="0"/>
+              <a:cs typeface="Microsoft Sans Serif" pitchFamily="34" charset="0"/>
+            </a:endParaRPr>
+          </a:p>
+          <a:p>
+            <a:pPr algn="ctr"/>
+            <a:endParaRPr lang="en-US" sz="4800" dirty="0" smtClean="0">
+              <a:latin typeface="Gill Sans MT" pitchFamily="34" charset="0"/>
+              <a:cs typeface="Microsoft Sans Serif" pitchFamily="34" charset="0"/>
+            </a:endParaRPr>
+          </a:p>
+          <a:p>
+            <a:pPr algn="ctr"/>
+            <a:r>
+              <a:rPr lang="en-US" sz="4800" dirty="0" smtClean="0">
+                <a:latin typeface="Gill Sans MT" pitchFamily="34" charset="0"/>
+                <a:cs typeface="Microsoft Sans Serif" pitchFamily="34" charset="0"/>
+              </a:rPr>
+              <a:t>Asked to Respond about </a:t>
+            </a:r>
+            <a:r>
+              <a:rPr lang="en-US" sz="4800" b="1" dirty="0" smtClean="0">
+                <a:latin typeface="Gill Sans MT" pitchFamily="34" charset="0"/>
+                <a:cs typeface="Microsoft Sans Serif" pitchFamily="34" charset="0"/>
+              </a:rPr>
+              <a:t>Contrast</a:t>
+            </a:r>
+            <a:endParaRPr lang="en-US" sz="4800" b="1" dirty="0">
+              <a:latin typeface="Gill Sans MT" pitchFamily="34" charset="0"/>
               <a:cs typeface="Microsoft Sans Serif" pitchFamily="34" charset="0"/>
             </a:endParaRPr>
           </a:p>
@@ -3611,7 +3724,7 @@
             <a:avLst/>
           </a:prstGeom>
           <a:solidFill>
-            <a:schemeClr val="accent4">
+            <a:schemeClr val="accent6">
               <a:lumMod val="60000"/>
               <a:lumOff val="40000"/>
             </a:schemeClr>
@@ -3640,23 +3753,48 @@
             <a:pPr algn="ctr"/>
             <a:r>
               <a:rPr lang="en-US" sz="4800" dirty="0" smtClean="0">
-                <a:latin typeface="Microsoft Sans Serif" pitchFamily="34" charset="0"/>
+                <a:latin typeface="Gill Sans MT" pitchFamily="34" charset="0"/>
                 <a:cs typeface="Microsoft Sans Serif" pitchFamily="34" charset="0"/>
               </a:rPr>
-              <a:t>Attending: Motion</a:t>
-            </a:r>
-          </a:p>
-          <a:p>
-            <a:pPr algn="ctr"/>
-            <a:r>
-              <a:rPr lang="en-US" sz="4800" dirty="0" smtClean="0">
-                <a:latin typeface="Microsoft Sans Serif" pitchFamily="34" charset="0"/>
+              <a:t>Paying Attention to </a:t>
+            </a:r>
+            <a:r>
+              <a:rPr lang="en-US" sz="4800" b="1" dirty="0" smtClean="0">
+                <a:latin typeface="Gill Sans MT" pitchFamily="34" charset="0"/>
                 <a:cs typeface="Microsoft Sans Serif" pitchFamily="34" charset="0"/>
               </a:rPr>
-              <a:t>Response: Contrast</a:t>
-            </a:r>
+              <a:t>Motion</a:t>
+            </a:r>
+            <a:endParaRPr lang="en-US" sz="4800" dirty="0" smtClean="0">
+              <a:latin typeface="Gill Sans MT" pitchFamily="34" charset="0"/>
+              <a:cs typeface="Microsoft Sans Serif" pitchFamily="34" charset="0"/>
+            </a:endParaRPr>
+          </a:p>
+          <a:p>
+            <a:pPr algn="ctr"/>
             <a:endParaRPr lang="en-US" sz="4800" dirty="0">
-              <a:latin typeface="Microsoft Sans Serif" pitchFamily="34" charset="0"/>
+              <a:latin typeface="Gill Sans MT" pitchFamily="34" charset="0"/>
+              <a:cs typeface="Microsoft Sans Serif" pitchFamily="34" charset="0"/>
+            </a:endParaRPr>
+          </a:p>
+          <a:p>
+            <a:pPr algn="ctr"/>
+            <a:r>
+              <a:rPr lang="en-US" sz="4800" dirty="0" smtClean="0">
+                <a:latin typeface="Gill Sans MT" pitchFamily="34" charset="0"/>
+                <a:cs typeface="Microsoft Sans Serif" pitchFamily="34" charset="0"/>
+              </a:rPr>
+              <a:t>Asked to Respond about </a:t>
+            </a:r>
+            <a:r>
+              <a:rPr lang="en-US" sz="4800" b="1" dirty="0" smtClean="0">
+                <a:latin typeface="Gill Sans MT" pitchFamily="34" charset="0"/>
+                <a:cs typeface="Microsoft Sans Serif" pitchFamily="34" charset="0"/>
+              </a:rPr>
+              <a:t>Contrast</a:t>
+            </a:r>
+            <a:endParaRPr lang="en-US" sz="4800" b="1" dirty="0">
+              <a:latin typeface="Gill Sans MT" pitchFamily="34" charset="0"/>
               <a:cs typeface="Microsoft Sans Serif" pitchFamily="34" charset="0"/>
             </a:endParaRPr>
           </a:p>
@@ -3677,7 +3815,7 @@
             <a:avLst/>
           </a:prstGeom>
           <a:solidFill>
-            <a:schemeClr val="accent6">
+            <a:schemeClr val="accent4">
               <a:lumMod val="60000"/>
               <a:lumOff val="40000"/>
             </a:schemeClr>
@@ -3706,23 +3844,48 @@
             <a:pPr algn="ctr"/>
             <a:r>
               <a:rPr lang="en-US" sz="4800" dirty="0" smtClean="0">
-                <a:latin typeface="Microsoft Sans Serif" pitchFamily="34" charset="0"/>
+                <a:latin typeface="Gill Sans MT" pitchFamily="34" charset="0"/>
                 <a:cs typeface="Microsoft Sans Serif" pitchFamily="34" charset="0"/>
               </a:rPr>
-              <a:t>Attending: Contrast</a:t>
-            </a:r>
-          </a:p>
-          <a:p>
-            <a:pPr algn="ctr"/>
-            <a:r>
-              <a:rPr lang="en-US" sz="4800" dirty="0" smtClean="0">
-                <a:latin typeface="Microsoft Sans Serif" pitchFamily="34" charset="0"/>
+              <a:t>Paying Attention to </a:t>
+            </a:r>
+            <a:r>
+              <a:rPr lang="en-US" sz="4800" b="1" dirty="0" smtClean="0">
+                <a:latin typeface="Gill Sans MT" pitchFamily="34" charset="0"/>
                 <a:cs typeface="Microsoft Sans Serif" pitchFamily="34" charset="0"/>
               </a:rPr>
-              <a:t>Response: Motion</a:t>
-            </a:r>
+              <a:t>Contrast</a:t>
+            </a:r>
+            <a:endParaRPr lang="en-US" sz="4800" dirty="0" smtClean="0">
+              <a:latin typeface="Gill Sans MT" pitchFamily="34" charset="0"/>
+              <a:cs typeface="Microsoft Sans Serif" pitchFamily="34" charset="0"/>
+            </a:endParaRPr>
+          </a:p>
+          <a:p>
+            <a:pPr algn="ctr"/>
             <a:endParaRPr lang="en-US" sz="4800" dirty="0">
-              <a:latin typeface="Microsoft Sans Serif" pitchFamily="34" charset="0"/>
+              <a:latin typeface="Gill Sans MT" pitchFamily="34" charset="0"/>
+              <a:cs typeface="Microsoft Sans Serif" pitchFamily="34" charset="0"/>
+            </a:endParaRPr>
+          </a:p>
+          <a:p>
+            <a:pPr algn="ctr"/>
+            <a:r>
+              <a:rPr lang="en-US" sz="4800" dirty="0" smtClean="0">
+                <a:latin typeface="Gill Sans MT" pitchFamily="34" charset="0"/>
+                <a:cs typeface="Microsoft Sans Serif" pitchFamily="34" charset="0"/>
+              </a:rPr>
+              <a:t>Asked to Respond about </a:t>
+            </a:r>
+            <a:r>
+              <a:rPr lang="en-US" sz="4800" b="1" dirty="0" smtClean="0">
+                <a:latin typeface="Gill Sans MT" pitchFamily="34" charset="0"/>
+                <a:cs typeface="Microsoft Sans Serif" pitchFamily="34" charset="0"/>
+              </a:rPr>
+              <a:t>Motion</a:t>
+            </a:r>
+            <a:endParaRPr lang="en-US" sz="4800" dirty="0">
+              <a:latin typeface="Gill Sans MT" pitchFamily="34" charset="0"/>
               <a:cs typeface="Microsoft Sans Serif" pitchFamily="34" charset="0"/>
             </a:endParaRPr>
           </a:p>
@@ -3766,23 +3929,48 @@
             <a:pPr algn="ctr"/>
             <a:r>
               <a:rPr lang="en-US" sz="4800" dirty="0" smtClean="0">
-                <a:latin typeface="Microsoft Sans Serif" pitchFamily="34" charset="0"/>
+                <a:latin typeface="Gill Sans MT" pitchFamily="34" charset="0"/>
                 <a:cs typeface="Microsoft Sans Serif" pitchFamily="34" charset="0"/>
               </a:rPr>
-              <a:t>Attending: Motion</a:t>
-            </a:r>
-          </a:p>
-          <a:p>
-            <a:pPr algn="ctr"/>
-            <a:r>
-              <a:rPr lang="en-US" sz="4800" dirty="0" smtClean="0">
-                <a:latin typeface="Microsoft Sans Serif" pitchFamily="34" charset="0"/>
+              <a:t>Paying Attention to </a:t>
+            </a:r>
+            <a:r>
+              <a:rPr lang="en-US" sz="4800" b="1" dirty="0" smtClean="0">
+                <a:latin typeface="Gill Sans MT" pitchFamily="34" charset="0"/>
                 <a:cs typeface="Microsoft Sans Serif" pitchFamily="34" charset="0"/>
               </a:rPr>
-              <a:t>Response: Motion</a:t>
-            </a:r>
+              <a:t>Motion</a:t>
+            </a:r>
+            <a:endParaRPr lang="en-US" sz="4800" dirty="0" smtClean="0">
+              <a:latin typeface="Gill Sans MT" pitchFamily="34" charset="0"/>
+              <a:cs typeface="Microsoft Sans Serif" pitchFamily="34" charset="0"/>
+            </a:endParaRPr>
+          </a:p>
+          <a:p>
+            <a:pPr algn="ctr"/>
             <a:endParaRPr lang="en-US" sz="4800" dirty="0">
-              <a:latin typeface="Microsoft Sans Serif" pitchFamily="34" charset="0"/>
+              <a:latin typeface="Gill Sans MT" pitchFamily="34" charset="0"/>
+              <a:cs typeface="Microsoft Sans Serif" pitchFamily="34" charset="0"/>
+            </a:endParaRPr>
+          </a:p>
+          <a:p>
+            <a:pPr algn="ctr"/>
+            <a:r>
+              <a:rPr lang="en-US" sz="4800" dirty="0" smtClean="0">
+                <a:latin typeface="Gill Sans MT" pitchFamily="34" charset="0"/>
+                <a:cs typeface="Microsoft Sans Serif" pitchFamily="34" charset="0"/>
+              </a:rPr>
+              <a:t>Asked to Respond about </a:t>
+            </a:r>
+            <a:r>
+              <a:rPr lang="en-US" sz="4800" b="1" dirty="0" smtClean="0">
+                <a:latin typeface="Gill Sans MT" pitchFamily="34" charset="0"/>
+                <a:cs typeface="Microsoft Sans Serif" pitchFamily="34" charset="0"/>
+              </a:rPr>
+              <a:t>Motion</a:t>
+            </a:r>
+            <a:endParaRPr lang="en-US" sz="4800" dirty="0">
+              <a:latin typeface="Gill Sans MT" pitchFamily="34" charset="0"/>
               <a:cs typeface="Microsoft Sans Serif" pitchFamily="34" charset="0"/>
             </a:endParaRPr>
           </a:p>
@@ -3824,7 +4012,7 @@
           <a:lstStyle/>
           <a:p>
             <a:endParaRPr lang="en-US">
-              <a:latin typeface="Microsoft Sans Serif" pitchFamily="34" charset="0"/>
+              <a:latin typeface="Gill Sans MT" pitchFamily="34" charset="0"/>
               <a:cs typeface="Microsoft Sans Serif" pitchFamily="34" charset="0"/>
             </a:endParaRPr>
           </a:p>
@@ -3866,7 +4054,7 @@
           <a:lstStyle/>
           <a:p>
             <a:endParaRPr lang="en-US">
-              <a:latin typeface="Microsoft Sans Serif" pitchFamily="34" charset="0"/>
+              <a:latin typeface="Gill Sans MT" pitchFamily="34" charset="0"/>
               <a:cs typeface="Microsoft Sans Serif" pitchFamily="34" charset="0"/>
             </a:endParaRPr>
           </a:p>
@@ -3881,7 +4069,7 @@
           <p:nvPr/>
         </p:nvPicPr>
         <p:blipFill>
-          <a:blip r:embed="rId2">
+          <a:blip r:embed="rId3">
             <a:extLst>
               <a:ext uri="{28A0092B-C50C-407E-A947-70E740481C1C}">
                 <a14:useLocalDpi xmlns:a14="http://schemas.microsoft.com/office/drawing/2010/main" val="0"/>
@@ -3915,19 +4103,104 @@
       </p:pic>
       <p:sp>
         <p:nvSpPr>
-          <p:cNvPr id="33" name="Rectangle 32"/>
-          <p:cNvSpPr/>
+          <p:cNvPr id="39" name="TextBox 38"/>
+          <p:cNvSpPr txBox="1"/>
           <p:nvPr/>
         </p:nvSpPr>
         <p:spPr>
           <a:xfrm>
-            <a:off x="1143000" y="5029201"/>
-            <a:ext cx="10591800" cy="26898599"/>
+            <a:off x="27602711" y="5538880"/>
+            <a:ext cx="8097858" cy="1323439"/>
           </a:xfrm>
           <a:prstGeom prst="rect">
             <a:avLst/>
           </a:prstGeom>
           <a:noFill/>
+        </p:spPr>
+        <p:txBody>
+          <a:bodyPr wrap="none" rtlCol="0">
+            <a:spAutoFit/>
+          </a:bodyPr>
+          <a:lstStyle/>
+          <a:p>
+            <a:r>
+              <a:rPr lang="en-US" dirty="0" smtClean="0">
+                <a:latin typeface="Gill Sans MT" pitchFamily="34" charset="0"/>
+                <a:cs typeface="Microsoft Sans Serif" pitchFamily="34" charset="0"/>
+              </a:rPr>
+              <a:t>Model of Behavior</a:t>
+            </a:r>
+            <a:endParaRPr lang="en-US" dirty="0">
+              <a:latin typeface="Gill Sans MT" pitchFamily="34" charset="0"/>
+              <a:cs typeface="Microsoft Sans Serif" pitchFamily="34" charset="0"/>
+            </a:endParaRPr>
+          </a:p>
+        </p:txBody>
+      </p:sp>
+      <p:sp>
+        <p:nvSpPr>
+          <p:cNvPr id="2" name="TextBox 1"/>
+          <p:cNvSpPr txBox="1"/>
+          <p:nvPr/>
+        </p:nvSpPr>
+        <p:spPr>
+          <a:xfrm>
+            <a:off x="32842200" y="1221908"/>
+            <a:ext cx="3620478" cy="2985433"/>
+          </a:xfrm>
+          <a:prstGeom prst="rect">
+            <a:avLst/>
+          </a:prstGeom>
+          <a:noFill/>
+        </p:spPr>
+        <p:txBody>
+          <a:bodyPr wrap="none" rtlCol="0">
+            <a:spAutoFit/>
+          </a:bodyPr>
+          <a:lstStyle/>
+          <a:p>
+            <a:pPr algn="ctr"/>
+            <a:r>
+              <a:rPr lang="en-US" sz="14000" b="1" dirty="0" smtClean="0">
+                <a:solidFill>
+                  <a:schemeClr val="bg1"/>
+                </a:solidFill>
+              </a:rPr>
+              <a:t>GRU</a:t>
+            </a:r>
+          </a:p>
+          <a:p>
+            <a:pPr algn="ctr"/>
+            <a:r>
+              <a:rPr lang="en-US" sz="4800" b="1" dirty="0" smtClean="0">
+                <a:solidFill>
+                  <a:schemeClr val="bg1"/>
+                </a:solidFill>
+              </a:rPr>
+              <a:t>.stanford.edu</a:t>
+            </a:r>
+            <a:endParaRPr lang="en-US" sz="4800" b="1" dirty="0">
+              <a:solidFill>
+                <a:schemeClr val="bg1"/>
+              </a:solidFill>
+            </a:endParaRPr>
+          </a:p>
+        </p:txBody>
+      </p:sp>
+      <p:sp>
+        <p:nvSpPr>
+          <p:cNvPr id="3" name="Rectangle 2"/>
+          <p:cNvSpPr/>
+          <p:nvPr/>
+        </p:nvSpPr>
+        <p:spPr>
+          <a:xfrm>
+            <a:off x="981648" y="6947796"/>
+            <a:ext cx="10210800" cy="7391400"/>
+          </a:xfrm>
+          <a:prstGeom prst="rect">
+            <a:avLst/>
+          </a:prstGeom>
         </p:spPr>
         <p:style>
           <a:lnRef idx="2">
@@ -3948,28 +4221,329 @@
           <a:lstStyle/>
           <a:p>
             <a:pPr algn="ctr"/>
-            <a:endParaRPr lang="en-US">
-              <a:latin typeface="Microsoft Sans Serif" pitchFamily="34" charset="0"/>
-              <a:cs typeface="Microsoft Sans Serif" pitchFamily="34" charset="0"/>
-            </a:endParaRPr>
-          </a:p>
-        </p:txBody>
-      </p:sp>
-      <p:sp>
-        <p:nvSpPr>
-          <p:cNvPr id="35" name="Rectangle 34"/>
+            <a:endParaRPr lang="en-US"/>
+          </a:p>
+        </p:txBody>
+      </p:sp>
+      <p:sp>
+        <p:nvSpPr>
+          <p:cNvPr id="7" name="Rectangle 6"/>
           <p:cNvSpPr/>
           <p:nvPr/>
         </p:nvSpPr>
         <p:spPr>
           <a:xfrm>
-            <a:off x="26479588" y="5029201"/>
-            <a:ext cx="10591800" cy="26898600"/>
+            <a:off x="1524000" y="12573000"/>
+            <a:ext cx="1295400" cy="1275347"/>
+          </a:xfrm>
+          <a:prstGeom prst="rect">
+            <a:avLst/>
+          </a:prstGeom>
+          <a:solidFill>
+            <a:schemeClr val="accent4"/>
+          </a:solidFill>
+        </p:spPr>
+        <p:style>
+          <a:lnRef idx="2">
+            <a:schemeClr val="accent1">
+              <a:shade val="50000"/>
+            </a:schemeClr>
+          </a:lnRef>
+          <a:fillRef idx="1">
+            <a:schemeClr val="accent1"/>
+          </a:fillRef>
+          <a:effectRef idx="0">
+            <a:schemeClr val="accent1"/>
+          </a:effectRef>
+          <a:fontRef idx="minor">
+            <a:schemeClr val="lt1"/>
+          </a:fontRef>
+        </p:style>
+        <p:txBody>
+          <a:bodyPr rtlCol="0" anchor="ctr"/>
+          <a:lstStyle/>
+          <a:p>
+            <a:pPr algn="ctr"/>
+            <a:endParaRPr lang="en-US"/>
+          </a:p>
+        </p:txBody>
+      </p:sp>
+      <p:sp>
+        <p:nvSpPr>
+          <p:cNvPr id="27" name="Rectangle 26"/>
+          <p:cNvSpPr/>
+          <p:nvPr/>
+        </p:nvSpPr>
+        <p:spPr>
+          <a:xfrm>
+            <a:off x="2964945" y="12047244"/>
+            <a:ext cx="1295400" cy="1801104"/>
+          </a:xfrm>
+          <a:prstGeom prst="rect">
+            <a:avLst/>
+          </a:prstGeom>
+          <a:solidFill>
+            <a:schemeClr val="accent4"/>
+          </a:solidFill>
+        </p:spPr>
+        <p:style>
+          <a:lnRef idx="2">
+            <a:schemeClr val="accent1">
+              <a:shade val="50000"/>
+            </a:schemeClr>
+          </a:lnRef>
+          <a:fillRef idx="1">
+            <a:schemeClr val="accent1"/>
+          </a:fillRef>
+          <a:effectRef idx="0">
+            <a:schemeClr val="accent1"/>
+          </a:effectRef>
+          <a:fontRef idx="minor">
+            <a:schemeClr val="lt1"/>
+          </a:fontRef>
+        </p:style>
+        <p:txBody>
+          <a:bodyPr rtlCol="0" anchor="ctr"/>
+          <a:lstStyle/>
+          <a:p>
+            <a:pPr algn="ctr"/>
+            <a:endParaRPr lang="en-US"/>
+          </a:p>
+        </p:txBody>
+      </p:sp>
+      <p:sp>
+        <p:nvSpPr>
+          <p:cNvPr id="28" name="Rectangle 27"/>
+          <p:cNvSpPr/>
+          <p:nvPr/>
+        </p:nvSpPr>
+        <p:spPr>
+          <a:xfrm>
+            <a:off x="4439980" y="7467600"/>
+            <a:ext cx="1295400" cy="6380747"/>
+          </a:xfrm>
+          <a:prstGeom prst="rect">
+            <a:avLst/>
+          </a:prstGeom>
+          <a:solidFill>
+            <a:schemeClr val="accent6">
+              <a:lumMod val="60000"/>
+              <a:lumOff val="40000"/>
+            </a:schemeClr>
+          </a:solidFill>
+        </p:spPr>
+        <p:style>
+          <a:lnRef idx="2">
+            <a:schemeClr val="accent1">
+              <a:shade val="50000"/>
+            </a:schemeClr>
+          </a:lnRef>
+          <a:fillRef idx="1">
+            <a:schemeClr val="accent1"/>
+          </a:fillRef>
+          <a:effectRef idx="0">
+            <a:schemeClr val="accent1"/>
+          </a:effectRef>
+          <a:fontRef idx="minor">
+            <a:schemeClr val="lt1"/>
+          </a:fontRef>
+        </p:style>
+        <p:txBody>
+          <a:bodyPr rtlCol="0" anchor="ctr"/>
+          <a:lstStyle/>
+          <a:p>
+            <a:pPr algn="ctr"/>
+            <a:endParaRPr lang="en-US"/>
+          </a:p>
+        </p:txBody>
+      </p:sp>
+      <p:sp>
+        <p:nvSpPr>
+          <p:cNvPr id="29" name="Rectangle 28"/>
+          <p:cNvSpPr/>
+          <p:nvPr/>
+        </p:nvSpPr>
+        <p:spPr>
+          <a:xfrm>
+            <a:off x="6296854" y="13086347"/>
+            <a:ext cx="1295400" cy="762000"/>
+          </a:xfrm>
+          <a:prstGeom prst="rect">
+            <a:avLst/>
+          </a:prstGeom>
+          <a:solidFill>
+            <a:schemeClr val="accent6"/>
+          </a:solidFill>
+        </p:spPr>
+        <p:style>
+          <a:lnRef idx="2">
+            <a:schemeClr val="accent1">
+              <a:shade val="50000"/>
+            </a:schemeClr>
+          </a:lnRef>
+          <a:fillRef idx="1">
+            <a:schemeClr val="accent1"/>
+          </a:fillRef>
+          <a:effectRef idx="0">
+            <a:schemeClr val="accent1"/>
+          </a:effectRef>
+          <a:fontRef idx="minor">
+            <a:schemeClr val="lt1"/>
+          </a:fontRef>
+        </p:style>
+        <p:txBody>
+          <a:bodyPr rtlCol="0" anchor="ctr"/>
+          <a:lstStyle/>
+          <a:p>
+            <a:pPr algn="ctr"/>
+            <a:endParaRPr lang="en-US"/>
+          </a:p>
+        </p:txBody>
+      </p:sp>
+      <p:sp>
+        <p:nvSpPr>
+          <p:cNvPr id="32" name="Rectangle 31"/>
+          <p:cNvSpPr/>
+          <p:nvPr/>
+        </p:nvSpPr>
+        <p:spPr>
+          <a:xfrm>
+            <a:off x="7737799" y="12573000"/>
+            <a:ext cx="1295400" cy="1275347"/>
+          </a:xfrm>
+          <a:prstGeom prst="rect">
+            <a:avLst/>
+          </a:prstGeom>
+          <a:solidFill>
+            <a:schemeClr val="accent6"/>
+          </a:solidFill>
+        </p:spPr>
+        <p:style>
+          <a:lnRef idx="2">
+            <a:schemeClr val="accent1">
+              <a:shade val="50000"/>
+            </a:schemeClr>
+          </a:lnRef>
+          <a:fillRef idx="1">
+            <a:schemeClr val="accent1"/>
+          </a:fillRef>
+          <a:effectRef idx="0">
+            <a:schemeClr val="accent1"/>
+          </a:effectRef>
+          <a:fontRef idx="minor">
+            <a:schemeClr val="lt1"/>
+          </a:fontRef>
+        </p:style>
+        <p:txBody>
+          <a:bodyPr rtlCol="0" anchor="ctr"/>
+          <a:lstStyle/>
+          <a:p>
+            <a:pPr algn="ctr"/>
+            <a:endParaRPr lang="en-US"/>
+          </a:p>
+        </p:txBody>
+      </p:sp>
+      <p:sp>
+        <p:nvSpPr>
+          <p:cNvPr id="36" name="Rectangle 35"/>
+          <p:cNvSpPr/>
+          <p:nvPr/>
+        </p:nvSpPr>
+        <p:spPr>
+          <a:xfrm>
+            <a:off x="9212834" y="12047243"/>
+            <a:ext cx="1295400" cy="1801104"/>
+          </a:xfrm>
+          <a:prstGeom prst="rect">
+            <a:avLst/>
+          </a:prstGeom>
+          <a:solidFill>
+            <a:schemeClr val="accent4">
+              <a:lumMod val="60000"/>
+              <a:lumOff val="40000"/>
+            </a:schemeClr>
+          </a:solidFill>
+        </p:spPr>
+        <p:style>
+          <a:lnRef idx="2">
+            <a:schemeClr val="accent1">
+              <a:shade val="50000"/>
+            </a:schemeClr>
+          </a:lnRef>
+          <a:fillRef idx="1">
+            <a:schemeClr val="accent1"/>
+          </a:fillRef>
+          <a:effectRef idx="0">
+            <a:schemeClr val="accent1"/>
+          </a:effectRef>
+          <a:fontRef idx="minor">
+            <a:schemeClr val="lt1"/>
+          </a:fontRef>
+        </p:style>
+        <p:txBody>
+          <a:bodyPr rtlCol="0" anchor="ctr"/>
+          <a:lstStyle/>
+          <a:p>
+            <a:pPr algn="ctr"/>
+            <a:endParaRPr lang="en-US"/>
+          </a:p>
+        </p:txBody>
+      </p:sp>
+      <p:pic>
+        <p:nvPicPr>
+          <p:cNvPr id="1026" name="Picture 2" descr="http://www.cns.nyu.edu/%7Edavid/courses/perception/lecturenotes/motion/motion-slides/motion.014.jpg"/>
+          <p:cNvPicPr>
+            <a:picLocks noChangeAspect="1" noChangeArrowheads="1"/>
+          </p:cNvPicPr>
+          <p:nvPr/>
+        </p:nvPicPr>
+        <p:blipFill>
+          <a:blip r:embed="rId4">
+            <a:extLst>
+              <a:ext uri="{28A0092B-C50C-407E-A947-70E740481C1C}">
+                <a14:useLocalDpi xmlns:a14="http://schemas.microsoft.com/office/drawing/2010/main" val="0"/>
+              </a:ext>
+            </a:extLst>
+          </a:blip>
+          <a:srcRect/>
+          <a:stretch>
+            <a:fillRect/>
+          </a:stretch>
+        </p:blipFill>
+        <p:spPr bwMode="auto">
+          <a:xfrm>
+            <a:off x="1256041" y="24222290"/>
+            <a:ext cx="4991100" cy="3743325"/>
           </a:xfrm>
           <a:prstGeom prst="rect">
             <a:avLst/>
           </a:prstGeom>
           <a:noFill/>
+          <a:extLst>
+            <a:ext uri="{909E8E84-426E-40DD-AFC4-6F175D3DCCD1}">
+              <a14:hiddenFill xmlns:a14="http://schemas.microsoft.com/office/drawing/2010/main">
+                <a:solidFill>
+                  <a:srgbClr val="FFFFFF"/>
+                </a:solidFill>
+              </a14:hiddenFill>
+            </a:ext>
+          </a:extLst>
+        </p:spPr>
+      </p:pic>
+      <p:sp>
+        <p:nvSpPr>
+          <p:cNvPr id="9" name="Rectangle 8"/>
+          <p:cNvSpPr/>
+          <p:nvPr/>
+        </p:nvSpPr>
+        <p:spPr>
+          <a:xfrm>
+            <a:off x="1365665" y="20040600"/>
+            <a:ext cx="9878766" cy="3962400"/>
+          </a:xfrm>
+          <a:prstGeom prst="rect">
+            <a:avLst/>
+          </a:prstGeom>
         </p:spPr>
         <p:style>
           <a:lnRef idx="2">
@@ -3990,28 +4564,24 @@
           <a:lstStyle/>
           <a:p>
             <a:pPr algn="ctr"/>
-            <a:endParaRPr lang="en-US">
-              <a:latin typeface="Microsoft Sans Serif" pitchFamily="34" charset="0"/>
-              <a:cs typeface="Microsoft Sans Serif" pitchFamily="34" charset="0"/>
-            </a:endParaRPr>
-          </a:p>
-        </p:txBody>
-      </p:sp>
-      <p:sp>
-        <p:nvSpPr>
-          <p:cNvPr id="37" name="Rectangle 36"/>
+            <a:endParaRPr lang="en-US" dirty="0"/>
+          </a:p>
+        </p:txBody>
+      </p:sp>
+      <p:sp>
+        <p:nvSpPr>
+          <p:cNvPr id="38" name="Rectangle 37"/>
           <p:cNvSpPr/>
           <p:nvPr/>
         </p:nvSpPr>
         <p:spPr>
           <a:xfrm>
-            <a:off x="12113151" y="20497800"/>
-            <a:ext cx="14023447" cy="11430000"/>
+            <a:off x="1156617" y="27734293"/>
+            <a:ext cx="9878766" cy="3962400"/>
           </a:xfrm>
           <a:prstGeom prst="rect">
             <a:avLst/>
           </a:prstGeom>
-          <a:noFill/>
         </p:spPr>
         <p:style>
           <a:lnRef idx="2">
@@ -4032,28 +4602,66 @@
           <a:lstStyle/>
           <a:p>
             <a:pPr algn="ctr"/>
-            <a:endParaRPr lang="en-US">
-              <a:latin typeface="Microsoft Sans Serif" pitchFamily="34" charset="0"/>
-              <a:cs typeface="Microsoft Sans Serif" pitchFamily="34" charset="0"/>
-            </a:endParaRPr>
-          </a:p>
-        </p:txBody>
-      </p:sp>
-      <p:sp>
-        <p:nvSpPr>
-          <p:cNvPr id="39" name="TextBox 38"/>
-          <p:cNvSpPr txBox="1"/>
+            <a:endParaRPr lang="en-US"/>
+          </a:p>
+        </p:txBody>
+      </p:sp>
+      <p:pic>
+        <p:nvPicPr>
+          <p:cNvPr id="1028" name="Picture 4" descr="https://encrypted-tbn2.gstatic.com/images?q=tbn:ANd9GcQf4VECxaeNCTDrABkgPJUvKFmuQr5lsfmg5ACKNutYpEIKejoQ"/>
+          <p:cNvPicPr>
+            <a:picLocks noChangeAspect="1" noChangeArrowheads="1"/>
+          </p:cNvPicPr>
           <p:nvPr/>
-        </p:nvSpPr>
-        <p:spPr>
-          <a:xfrm>
-            <a:off x="27602711" y="5538880"/>
-            <a:ext cx="8802410" cy="1323439"/>
+        </p:nvPicPr>
+        <p:blipFill>
+          <a:blip r:embed="rId5">
+            <a:extLst>
+              <a:ext uri="{28A0092B-C50C-407E-A947-70E740481C1C}">
+                <a14:useLocalDpi xmlns:a14="http://schemas.microsoft.com/office/drawing/2010/main" val="0"/>
+              </a:ext>
+            </a:extLst>
+          </a:blip>
+          <a:srcRect/>
+          <a:stretch>
+            <a:fillRect/>
+          </a:stretch>
+        </p:blipFill>
+        <p:spPr bwMode="auto">
+          <a:xfrm>
+            <a:off x="6880548" y="24436102"/>
+            <a:ext cx="2979985" cy="2940428"/>
           </a:xfrm>
           <a:prstGeom prst="rect">
             <a:avLst/>
           </a:prstGeom>
           <a:noFill/>
+          <a:extLst>
+            <a:ext uri="{909E8E84-426E-40DD-AFC4-6F175D3DCCD1}">
+              <a14:hiddenFill xmlns:a14="http://schemas.microsoft.com/office/drawing/2010/main">
+                <a:solidFill>
+                  <a:srgbClr val="FFFFFF"/>
+                </a:solidFill>
+              </a14:hiddenFill>
+            </a:ext>
+          </a:extLst>
+        </p:spPr>
+      </p:pic>
+      <p:sp>
+        <p:nvSpPr>
+          <p:cNvPr id="11" name="TextBox 10"/>
+          <p:cNvSpPr txBox="1"/>
+          <p:nvPr/>
+        </p:nvSpPr>
+        <p:spPr>
+          <a:xfrm>
+            <a:off x="1423872" y="20164925"/>
+            <a:ext cx="1285929" cy="1323439"/>
+          </a:xfrm>
+          <a:prstGeom prst="rect">
+            <a:avLst/>
+          </a:prstGeom>
+          <a:noFill/>
         </p:spPr>
         <p:txBody>
           <a:bodyPr wrap="none" rtlCol="0">
@@ -4062,19 +4670,699 @@
           <a:lstStyle/>
           <a:p>
             <a:r>
-              <a:rPr lang="en-US" dirty="0" smtClean="0">
-                <a:latin typeface="Microsoft Sans Serif" pitchFamily="34" charset="0"/>
-                <a:cs typeface="Microsoft Sans Serif" pitchFamily="34" charset="0"/>
-              </a:rPr>
-              <a:t>V1-&gt; MT Hierarchy</a:t>
-            </a:r>
-            <a:endParaRPr lang="en-US" dirty="0">
-              <a:latin typeface="Microsoft Sans Serif" pitchFamily="34" charset="0"/>
-              <a:cs typeface="Microsoft Sans Serif" pitchFamily="34" charset="0"/>
-            </a:endParaRPr>
-          </a:p>
-        </p:txBody>
-      </p:sp>
+              <a:rPr lang="en-US" dirty="0" smtClean="0"/>
+              <a:t>V1</a:t>
+            </a:r>
+            <a:endParaRPr lang="en-US" dirty="0"/>
+          </a:p>
+        </p:txBody>
+      </p:sp>
+      <p:sp>
+        <p:nvSpPr>
+          <p:cNvPr id="13" name="TextBox 12"/>
+          <p:cNvSpPr txBox="1"/>
+          <p:nvPr/>
+        </p:nvSpPr>
+        <p:spPr>
+          <a:xfrm>
+            <a:off x="1286013" y="27758356"/>
+            <a:ext cx="1561646" cy="1323439"/>
+          </a:xfrm>
+          <a:prstGeom prst="rect">
+            <a:avLst/>
+          </a:prstGeom>
+          <a:noFill/>
+        </p:spPr>
+        <p:txBody>
+          <a:bodyPr wrap="none" rtlCol="0">
+            <a:spAutoFit/>
+          </a:bodyPr>
+          <a:lstStyle/>
+          <a:p>
+            <a:r>
+              <a:rPr lang="en-US" dirty="0" smtClean="0"/>
+              <a:t>MT</a:t>
+            </a:r>
+            <a:endParaRPr lang="en-US" dirty="0"/>
+          </a:p>
+        </p:txBody>
+      </p:sp>
+      <p:cxnSp>
+        <p:nvCxnSpPr>
+          <p:cNvPr id="16" name="Straight Connector 15"/>
+          <p:cNvCxnSpPr/>
+          <p:nvPr/>
+        </p:nvCxnSpPr>
+        <p:spPr>
+          <a:xfrm flipV="1">
+            <a:off x="2847659" y="20955000"/>
+            <a:ext cx="6895588" cy="2518595"/>
+          </a:xfrm>
+          <a:prstGeom prst="line">
+            <a:avLst/>
+          </a:prstGeom>
+          <a:ln w="76200"/>
+        </p:spPr>
+        <p:style>
+          <a:lnRef idx="3">
+            <a:schemeClr val="accent6"/>
+          </a:lnRef>
+          <a:fillRef idx="0">
+            <a:schemeClr val="accent6"/>
+          </a:fillRef>
+          <a:effectRef idx="2">
+            <a:schemeClr val="accent6"/>
+          </a:effectRef>
+          <a:fontRef idx="minor">
+            <a:schemeClr val="tx1"/>
+          </a:fontRef>
+        </p:style>
+      </p:cxnSp>
+      <p:cxnSp>
+        <p:nvCxnSpPr>
+          <p:cNvPr id="19" name="Straight Connector 18"/>
+          <p:cNvCxnSpPr/>
+          <p:nvPr/>
+        </p:nvCxnSpPr>
+        <p:spPr>
+          <a:xfrm flipV="1">
+            <a:off x="2819400" y="20726400"/>
+            <a:ext cx="7041133" cy="2518595"/>
+          </a:xfrm>
+          <a:prstGeom prst="line">
+            <a:avLst/>
+          </a:prstGeom>
+          <a:ln w="76200"/>
+        </p:spPr>
+        <p:style>
+          <a:lnRef idx="3">
+            <a:schemeClr val="accent4"/>
+          </a:lnRef>
+          <a:fillRef idx="0">
+            <a:schemeClr val="accent4"/>
+          </a:fillRef>
+          <a:effectRef idx="2">
+            <a:schemeClr val="accent4"/>
+          </a:effectRef>
+          <a:fontRef idx="minor">
+            <a:schemeClr val="tx1"/>
+          </a:fontRef>
+        </p:style>
+      </p:cxnSp>
+      <p:cxnSp>
+        <p:nvCxnSpPr>
+          <p:cNvPr id="41" name="Straight Connector 40"/>
+          <p:cNvCxnSpPr/>
+          <p:nvPr/>
+        </p:nvCxnSpPr>
+        <p:spPr>
+          <a:xfrm>
+            <a:off x="9743247" y="20688318"/>
+            <a:ext cx="0" cy="533364"/>
+          </a:xfrm>
+          <a:prstGeom prst="line">
+            <a:avLst/>
+          </a:prstGeom>
+          <a:ln w="76200"/>
+        </p:spPr>
+        <p:style>
+          <a:lnRef idx="3">
+            <a:schemeClr val="accent6"/>
+          </a:lnRef>
+          <a:fillRef idx="0">
+            <a:schemeClr val="accent6"/>
+          </a:fillRef>
+          <a:effectRef idx="2">
+            <a:schemeClr val="accent6"/>
+          </a:effectRef>
+          <a:fontRef idx="minor">
+            <a:schemeClr val="tx1"/>
+          </a:fontRef>
+        </p:style>
+      </p:cxnSp>
+      <p:cxnSp>
+        <p:nvCxnSpPr>
+          <p:cNvPr id="45" name="Straight Connector 44"/>
+          <p:cNvCxnSpPr/>
+          <p:nvPr/>
+        </p:nvCxnSpPr>
+        <p:spPr>
+          <a:xfrm>
+            <a:off x="9860533" y="20421636"/>
+            <a:ext cx="0" cy="533364"/>
+          </a:xfrm>
+          <a:prstGeom prst="line">
+            <a:avLst/>
+          </a:prstGeom>
+          <a:ln w="76200"/>
+        </p:spPr>
+        <p:style>
+          <a:lnRef idx="3">
+            <a:schemeClr val="accent4"/>
+          </a:lnRef>
+          <a:fillRef idx="0">
+            <a:schemeClr val="accent4"/>
+          </a:fillRef>
+          <a:effectRef idx="2">
+            <a:schemeClr val="accent4"/>
+          </a:effectRef>
+          <a:fontRef idx="minor">
+            <a:schemeClr val="tx1"/>
+          </a:fontRef>
+        </p:style>
+      </p:cxnSp>
+      <p:cxnSp>
+        <p:nvCxnSpPr>
+          <p:cNvPr id="48" name="Straight Connector 47"/>
+          <p:cNvCxnSpPr/>
+          <p:nvPr/>
+        </p:nvCxnSpPr>
+        <p:spPr>
+          <a:xfrm flipV="1">
+            <a:off x="2729300" y="28676740"/>
+            <a:ext cx="6895588" cy="2518595"/>
+          </a:xfrm>
+          <a:prstGeom prst="line">
+            <a:avLst/>
+          </a:prstGeom>
+          <a:ln w="76200"/>
+        </p:spPr>
+        <p:style>
+          <a:lnRef idx="3">
+            <a:schemeClr val="accent6"/>
+          </a:lnRef>
+          <a:fillRef idx="0">
+            <a:schemeClr val="accent6"/>
+          </a:fillRef>
+          <a:effectRef idx="2">
+            <a:schemeClr val="accent6"/>
+          </a:effectRef>
+          <a:fontRef idx="minor">
+            <a:schemeClr val="tx1"/>
+          </a:fontRef>
+        </p:style>
+      </p:cxnSp>
+      <p:cxnSp>
+        <p:nvCxnSpPr>
+          <p:cNvPr id="49" name="Straight Connector 48"/>
+          <p:cNvCxnSpPr/>
+          <p:nvPr/>
+        </p:nvCxnSpPr>
+        <p:spPr>
+          <a:xfrm flipV="1">
+            <a:off x="2729300" y="30861000"/>
+            <a:ext cx="6895588" cy="334335"/>
+          </a:xfrm>
+          <a:prstGeom prst="line">
+            <a:avLst/>
+          </a:prstGeom>
+          <a:ln w="76200"/>
+        </p:spPr>
+        <p:style>
+          <a:lnRef idx="3">
+            <a:schemeClr val="accent4"/>
+          </a:lnRef>
+          <a:fillRef idx="0">
+            <a:schemeClr val="accent4"/>
+          </a:fillRef>
+          <a:effectRef idx="2">
+            <a:schemeClr val="accent4"/>
+          </a:effectRef>
+          <a:fontRef idx="minor">
+            <a:schemeClr val="tx1"/>
+          </a:fontRef>
+        </p:style>
+      </p:cxnSp>
+      <p:cxnSp>
+        <p:nvCxnSpPr>
+          <p:cNvPr id="50" name="Straight Connector 49"/>
+          <p:cNvCxnSpPr/>
+          <p:nvPr/>
+        </p:nvCxnSpPr>
+        <p:spPr>
+          <a:xfrm>
+            <a:off x="9624888" y="28410058"/>
+            <a:ext cx="0" cy="533364"/>
+          </a:xfrm>
+          <a:prstGeom prst="line">
+            <a:avLst/>
+          </a:prstGeom>
+          <a:ln w="76200"/>
+        </p:spPr>
+        <p:style>
+          <a:lnRef idx="3">
+            <a:schemeClr val="accent6"/>
+          </a:lnRef>
+          <a:fillRef idx="0">
+            <a:schemeClr val="accent6"/>
+          </a:fillRef>
+          <a:effectRef idx="2">
+            <a:schemeClr val="accent6"/>
+          </a:effectRef>
+          <a:fontRef idx="minor">
+            <a:schemeClr val="tx1"/>
+          </a:fontRef>
+        </p:style>
+      </p:cxnSp>
+      <p:cxnSp>
+        <p:nvCxnSpPr>
+          <p:cNvPr id="51" name="Straight Connector 50"/>
+          <p:cNvCxnSpPr/>
+          <p:nvPr/>
+        </p:nvCxnSpPr>
+        <p:spPr>
+          <a:xfrm>
+            <a:off x="9624888" y="30661971"/>
+            <a:ext cx="0" cy="533364"/>
+          </a:xfrm>
+          <a:prstGeom prst="line">
+            <a:avLst/>
+          </a:prstGeom>
+          <a:ln w="76200"/>
+        </p:spPr>
+        <p:style>
+          <a:lnRef idx="3">
+            <a:schemeClr val="accent4"/>
+          </a:lnRef>
+          <a:fillRef idx="0">
+            <a:schemeClr val="accent4"/>
+          </a:fillRef>
+          <a:effectRef idx="2">
+            <a:schemeClr val="accent4"/>
+          </a:effectRef>
+          <a:fontRef idx="minor">
+            <a:schemeClr val="tx1"/>
+          </a:fontRef>
+        </p:style>
+      </p:cxnSp>
+      <p:sp>
+        <p:nvSpPr>
+          <p:cNvPr id="47" name="TextBox 46"/>
+          <p:cNvSpPr txBox="1"/>
+          <p:nvPr/>
+        </p:nvSpPr>
+        <p:spPr>
+          <a:xfrm>
+            <a:off x="1356713" y="14565595"/>
+            <a:ext cx="4284122" cy="646331"/>
+          </a:xfrm>
+          <a:prstGeom prst="rect">
+            <a:avLst/>
+          </a:prstGeom>
+          <a:noFill/>
+        </p:spPr>
+        <p:txBody>
+          <a:bodyPr wrap="none" rtlCol="0">
+            <a:spAutoFit/>
+          </a:bodyPr>
+          <a:lstStyle/>
+          <a:p>
+            <a:r>
+              <a:rPr lang="en-US" sz="3600" dirty="0" smtClean="0"/>
+              <a:t>Contrast Performance</a:t>
+            </a:r>
+            <a:endParaRPr lang="en-US" sz="3600" dirty="0"/>
+          </a:p>
+        </p:txBody>
+      </p:sp>
+      <p:sp>
+        <p:nvSpPr>
+          <p:cNvPr id="55" name="TextBox 54"/>
+          <p:cNvSpPr txBox="1"/>
+          <p:nvPr/>
+        </p:nvSpPr>
+        <p:spPr>
+          <a:xfrm>
+            <a:off x="6286501" y="14559383"/>
+            <a:ext cx="4083490" cy="646331"/>
+          </a:xfrm>
+          <a:prstGeom prst="rect">
+            <a:avLst/>
+          </a:prstGeom>
+          <a:noFill/>
+        </p:spPr>
+        <p:txBody>
+          <a:bodyPr wrap="none" rtlCol="0">
+            <a:spAutoFit/>
+          </a:bodyPr>
+          <a:lstStyle/>
+          <a:p>
+            <a:r>
+              <a:rPr lang="en-US" sz="3600" dirty="0" smtClean="0"/>
+              <a:t>Motion Performance</a:t>
+            </a:r>
+            <a:endParaRPr lang="en-US" sz="3600" dirty="0"/>
+          </a:p>
+        </p:txBody>
+      </p:sp>
+      <p:pic>
+        <p:nvPicPr>
+          <p:cNvPr id="66" name="Picture 2" descr="http://www.cns.nyu.edu/%7Edavid/courses/perception/lecturenotes/motion/motion-slides/motion.014.jpg"/>
+          <p:cNvPicPr>
+            <a:picLocks noChangeAspect="1" noChangeArrowheads="1"/>
+          </p:cNvPicPr>
+          <p:nvPr/>
+        </p:nvPicPr>
+        <p:blipFill>
+          <a:blip r:embed="rId4">
+            <a:extLst>
+              <a:ext uri="{28A0092B-C50C-407E-A947-70E740481C1C}">
+                <a14:useLocalDpi xmlns:a14="http://schemas.microsoft.com/office/drawing/2010/main" val="0"/>
+              </a:ext>
+            </a:extLst>
+          </a:blip>
+          <a:srcRect/>
+          <a:stretch>
+            <a:fillRect/>
+          </a:stretch>
+        </p:blipFill>
+        <p:spPr bwMode="auto">
+          <a:xfrm>
+            <a:off x="26660539" y="18397000"/>
+            <a:ext cx="10770099" cy="8077574"/>
+          </a:xfrm>
+          <a:prstGeom prst="rect">
+            <a:avLst/>
+          </a:prstGeom>
+          <a:noFill/>
+          <a:extLst>
+            <a:ext uri="{909E8E84-426E-40DD-AFC4-6F175D3DCCD1}">
+              <a14:hiddenFill xmlns:a14="http://schemas.microsoft.com/office/drawing/2010/main">
+                <a:solidFill>
+                  <a:srgbClr val="FFFFFF"/>
+                </a:solidFill>
+              </a14:hiddenFill>
+            </a:ext>
+          </a:extLst>
+        </p:spPr>
+      </p:pic>
+      <p:sp>
+        <p:nvSpPr>
+          <p:cNvPr id="62" name="Rectangle 61"/>
+          <p:cNvSpPr/>
+          <p:nvPr/>
+        </p:nvSpPr>
+        <p:spPr>
+          <a:xfrm>
+            <a:off x="30729026" y="30042486"/>
+            <a:ext cx="2743200" cy="1760656"/>
+          </a:xfrm>
+          <a:prstGeom prst="rect">
+            <a:avLst/>
+          </a:prstGeom>
+        </p:spPr>
+        <p:style>
+          <a:lnRef idx="2">
+            <a:schemeClr val="accent1">
+              <a:shade val="50000"/>
+            </a:schemeClr>
+          </a:lnRef>
+          <a:fillRef idx="1">
+            <a:schemeClr val="accent1"/>
+          </a:fillRef>
+          <a:effectRef idx="0">
+            <a:schemeClr val="accent1"/>
+          </a:effectRef>
+          <a:fontRef idx="minor">
+            <a:schemeClr val="lt1"/>
+          </a:fontRef>
+        </p:style>
+        <p:txBody>
+          <a:bodyPr rtlCol="0" anchor="ctr"/>
+          <a:lstStyle/>
+          <a:p>
+            <a:pPr algn="ctr"/>
+            <a:r>
+              <a:rPr lang="en-US" dirty="0" smtClean="0"/>
+              <a:t>V1</a:t>
+            </a:r>
+            <a:endParaRPr lang="en-US" dirty="0"/>
+          </a:p>
+        </p:txBody>
+      </p:sp>
+      <p:cxnSp>
+        <p:nvCxnSpPr>
+          <p:cNvPr id="64" name="Straight Arrow Connector 63"/>
+          <p:cNvCxnSpPr/>
+          <p:nvPr/>
+        </p:nvCxnSpPr>
+        <p:spPr>
+          <a:xfrm flipV="1">
+            <a:off x="31663479" y="27947191"/>
+            <a:ext cx="0" cy="1970422"/>
+          </a:xfrm>
+          <a:prstGeom prst="straightConnector1">
+            <a:avLst/>
+          </a:prstGeom>
+          <a:ln w="76200">
+            <a:tailEnd type="arrow"/>
+          </a:ln>
+        </p:spPr>
+        <p:style>
+          <a:lnRef idx="1">
+            <a:schemeClr val="accent1"/>
+          </a:lnRef>
+          <a:fillRef idx="0">
+            <a:schemeClr val="accent1"/>
+          </a:fillRef>
+          <a:effectRef idx="0">
+            <a:schemeClr val="accent1"/>
+          </a:effectRef>
+          <a:fontRef idx="minor">
+            <a:schemeClr val="tx1"/>
+          </a:fontRef>
+        </p:style>
+      </p:cxnSp>
+      <p:sp>
+        <p:nvSpPr>
+          <p:cNvPr id="65" name="Rectangle 64"/>
+          <p:cNvSpPr/>
+          <p:nvPr/>
+        </p:nvSpPr>
+        <p:spPr>
+          <a:xfrm>
+            <a:off x="30729026" y="26200401"/>
+            <a:ext cx="2743200" cy="1640341"/>
+          </a:xfrm>
+          <a:prstGeom prst="rect">
+            <a:avLst/>
+          </a:prstGeom>
+        </p:spPr>
+        <p:style>
+          <a:lnRef idx="2">
+            <a:schemeClr val="accent1">
+              <a:shade val="50000"/>
+            </a:schemeClr>
+          </a:lnRef>
+          <a:fillRef idx="1">
+            <a:schemeClr val="accent1"/>
+          </a:fillRef>
+          <a:effectRef idx="0">
+            <a:schemeClr val="accent1"/>
+          </a:effectRef>
+          <a:fontRef idx="minor">
+            <a:schemeClr val="lt1"/>
+          </a:fontRef>
+        </p:style>
+        <p:txBody>
+          <a:bodyPr rtlCol="0" anchor="ctr"/>
+          <a:lstStyle/>
+          <a:p>
+            <a:pPr algn="ctr"/>
+            <a:r>
+              <a:rPr lang="en-US" dirty="0" smtClean="0"/>
+              <a:t>MT</a:t>
+            </a:r>
+            <a:endParaRPr lang="en-US" dirty="0"/>
+          </a:p>
+        </p:txBody>
+      </p:sp>
+      <p:cxnSp>
+        <p:nvCxnSpPr>
+          <p:cNvPr id="71" name="Straight Arrow Connector 70"/>
+          <p:cNvCxnSpPr/>
+          <p:nvPr/>
+        </p:nvCxnSpPr>
+        <p:spPr>
+          <a:xfrm>
+            <a:off x="32410569" y="28071849"/>
+            <a:ext cx="0" cy="1885529"/>
+          </a:xfrm>
+          <a:prstGeom prst="straightConnector1">
+            <a:avLst/>
+          </a:prstGeom>
+          <a:ln w="12700">
+            <a:tailEnd type="arrow"/>
+          </a:ln>
+        </p:spPr>
+        <p:style>
+          <a:lnRef idx="1">
+            <a:schemeClr val="accent1"/>
+          </a:lnRef>
+          <a:fillRef idx="0">
+            <a:schemeClr val="accent1"/>
+          </a:fillRef>
+          <a:effectRef idx="0">
+            <a:schemeClr val="accent1"/>
+          </a:effectRef>
+          <a:fontRef idx="minor">
+            <a:schemeClr val="tx1"/>
+          </a:fontRef>
+        </p:style>
+      </p:cxnSp>
+      <p:sp>
+        <p:nvSpPr>
+          <p:cNvPr id="68" name="TextBox 67"/>
+          <p:cNvSpPr txBox="1"/>
+          <p:nvPr/>
+        </p:nvSpPr>
+        <p:spPr>
+          <a:xfrm>
+            <a:off x="12228309" y="22192095"/>
+            <a:ext cx="13757035" cy="6740307"/>
+          </a:xfrm>
+          <a:prstGeom prst="rect">
+            <a:avLst/>
+          </a:prstGeom>
+          <a:noFill/>
+        </p:spPr>
+        <p:txBody>
+          <a:bodyPr wrap="square" rtlCol="0">
+            <a:spAutoFit/>
+          </a:bodyPr>
+          <a:lstStyle/>
+          <a:p>
+            <a:pPr algn="just"/>
+            <a:r>
+              <a:rPr lang="en-US" sz="4800" dirty="0" smtClean="0"/>
+              <a:t>We observed an asymmetry in how attention to contrast and motion interact in the visual system. Data recorded from fMRI sessions suggests that attention to contrast inhibits the representation of motion in area MT, but that the reverse is not true.</a:t>
+            </a:r>
+          </a:p>
+          <a:p>
+            <a:pPr algn="just"/>
+            <a:endParaRPr lang="en-US" sz="4800" dirty="0"/>
+          </a:p>
+          <a:p>
+            <a:pPr algn="just"/>
+            <a:r>
+              <a:rPr lang="en-US" sz="4800" dirty="0" smtClean="0"/>
+              <a:t>In future work we will investigate whether this hierarchical relationship is a general feature of the visual system.</a:t>
+            </a:r>
+            <a:endParaRPr lang="en-US" sz="4800" dirty="0"/>
+          </a:p>
+        </p:txBody>
+      </p:sp>
+      <p:sp>
+        <p:nvSpPr>
+          <p:cNvPr id="69" name="TextBox 68"/>
+          <p:cNvSpPr txBox="1"/>
+          <p:nvPr/>
+        </p:nvSpPr>
+        <p:spPr>
+          <a:xfrm>
+            <a:off x="488350" y="15498411"/>
+            <a:ext cx="11377488" cy="2308324"/>
+          </a:xfrm>
+          <a:prstGeom prst="rect">
+            <a:avLst/>
+          </a:prstGeom>
+          <a:noFill/>
+        </p:spPr>
+        <p:txBody>
+          <a:bodyPr wrap="square" rtlCol="0">
+            <a:spAutoFit/>
+          </a:bodyPr>
+          <a:lstStyle/>
+          <a:p>
+            <a:pPr algn="just"/>
+            <a:r>
+              <a:rPr lang="en-US" sz="3600" dirty="0" smtClean="0"/>
+              <a:t>Participants were asked to estimate which of two dot displays had higher contrast or motion coherence. Threshold performance is shown (higher values indicate worse performance).  </a:t>
+            </a:r>
+            <a:endParaRPr lang="en-US" sz="3600" dirty="0"/>
+          </a:p>
+        </p:txBody>
+      </p:sp>
+      <p:sp>
+        <p:nvSpPr>
+          <p:cNvPr id="70" name="Rectangle 69"/>
+          <p:cNvSpPr/>
+          <p:nvPr/>
+        </p:nvSpPr>
+        <p:spPr>
+          <a:xfrm>
+            <a:off x="6081793" y="7581190"/>
+            <a:ext cx="4824347" cy="2409721"/>
+          </a:xfrm>
+          <a:prstGeom prst="rect">
+            <a:avLst/>
+          </a:prstGeom>
+          <a:ln w="76200"/>
+        </p:spPr>
+        <p:style>
+          <a:lnRef idx="2">
+            <a:schemeClr val="dk1"/>
+          </a:lnRef>
+          <a:fillRef idx="1">
+            <a:schemeClr val="lt1"/>
+          </a:fillRef>
+          <a:effectRef idx="0">
+            <a:schemeClr val="dk1"/>
+          </a:effectRef>
+          <a:fontRef idx="minor">
+            <a:schemeClr val="dk1"/>
+          </a:fontRef>
+        </p:style>
+        <p:txBody>
+          <a:bodyPr rtlCol="0" anchor="ctr"/>
+          <a:lstStyle/>
+          <a:p>
+            <a:pPr algn="ctr"/>
+            <a:endParaRPr lang="en-US"/>
+          </a:p>
+        </p:txBody>
+      </p:sp>
+      <p:pic>
+        <p:nvPicPr>
+          <p:cNvPr id="1032" name="Picture 8" descr="C:\Users\Dan\proj\att_awe\talks\figures\contrast.gif"/>
+          <p:cNvPicPr>
+            <a:picLocks noChangeAspect="1" noChangeArrowheads="1" noCrop="1"/>
+          </p:cNvPicPr>
+          <p:nvPr/>
+        </p:nvPicPr>
+        <p:blipFill>
+          <a:blip r:embed="rId6">
+            <a:extLst>
+              <a:ext uri="{28A0092B-C50C-407E-A947-70E740481C1C}">
+                <a14:useLocalDpi xmlns:a14="http://schemas.microsoft.com/office/drawing/2010/main" val="0"/>
+              </a:ext>
+            </a:extLst>
+          </a:blip>
+          <a:srcRect/>
+          <a:stretch>
+            <a:fillRect/>
+          </a:stretch>
+        </p:blipFill>
+        <p:spPr bwMode="auto">
+          <a:xfrm>
+            <a:off x="6096000" y="7585841"/>
+            <a:ext cx="4810140" cy="2405070"/>
+          </a:xfrm>
+          <a:prstGeom prst="rect">
+            <a:avLst/>
+          </a:prstGeom>
+          <a:noFill/>
+          <a:extLst>
+            <a:ext uri="{909E8E84-426E-40DD-AFC4-6F175D3DCCD1}">
+              <a14:hiddenFill xmlns:a14="http://schemas.microsoft.com/office/drawing/2010/main">
+                <a:solidFill>
+                  <a:srgbClr val="FFFFFF"/>
+                </a:solidFill>
+              </a14:hiddenFill>
+            </a:ext>
+          </a:extLst>
+        </p:spPr>
+      </p:pic>
     </p:spTree>
     <p:extLst>
       <p:ext uri="{BB962C8B-B14F-4D97-AF65-F5344CB8AC3E}">

</xml_diff>

<commit_message>
More minor poster updates
</commit_message>
<xml_diff>
--- a/posters/sni_2015.pptx
+++ b/posters/sni_2015.pptx
@@ -3243,8 +3243,8 @@
         </p:nvSpPr>
         <p:spPr>
           <a:xfrm>
-            <a:off x="1524000" y="952500"/>
-            <a:ext cx="35356800" cy="3524250"/>
+            <a:off x="977905" y="952500"/>
+            <a:ext cx="36448990" cy="3524250"/>
           </a:xfrm>
           <a:prstGeom prst="rect">
             <a:avLst/>
@@ -3289,45 +3289,24 @@
                 <a:latin typeface="Gill Sans MT" pitchFamily="34" charset="0"/>
                 <a:cs typeface="Microsoft Sans Serif" pitchFamily="34" charset="0"/>
               </a:rPr>
-              <a:t>Asymmetrical </a:t>
-            </a:r>
+              <a:t>Asymmetrical Behavioral Effects of Feature-Based Attention</a:t>
+            </a:r>
+          </a:p>
+          <a:p>
+            <a:pPr algn="ctr"/>
             <a:r>
               <a:rPr lang="en-US" sz="4800" dirty="0" smtClean="0">
                 <a:latin typeface="Gill Sans MT" pitchFamily="34" charset="0"/>
                 <a:cs typeface="Microsoft Sans Serif" pitchFamily="34" charset="0"/>
               </a:rPr>
-              <a:t>Behavioral Effects </a:t>
+              <a:t>Are Predictable </a:t>
             </a:r>
             <a:r>
               <a:rPr lang="en-US" sz="4800" dirty="0" smtClean="0">
                 <a:latin typeface="Gill Sans MT" pitchFamily="34" charset="0"/>
                 <a:cs typeface="Microsoft Sans Serif" pitchFamily="34" charset="0"/>
               </a:rPr>
-              <a:t>of Feature-Based </a:t>
-            </a:r>
-            <a:r>
-              <a:rPr lang="en-US" sz="4800" dirty="0" smtClean="0">
-                <a:latin typeface="Gill Sans MT" pitchFamily="34" charset="0"/>
-                <a:cs typeface="Microsoft Sans Serif" pitchFamily="34" charset="0"/>
-              </a:rPr>
-              <a:t>Attention</a:t>
-            </a:r>
-          </a:p>
-          <a:p>
-            <a:pPr algn="ctr"/>
-            <a:r>
-              <a:rPr lang="en-US" sz="4800" dirty="0" smtClean="0">
-                <a:latin typeface="Gill Sans MT" pitchFamily="34" charset="0"/>
-                <a:cs typeface="Microsoft Sans Serif" pitchFamily="34" charset="0"/>
-              </a:rPr>
-              <a:t>Can </a:t>
-            </a:r>
-            <a:r>
-              <a:rPr lang="en-US" sz="4800" dirty="0" smtClean="0">
-                <a:latin typeface="Gill Sans MT" pitchFamily="34" charset="0"/>
-                <a:cs typeface="Microsoft Sans Serif" pitchFamily="34" charset="0"/>
-              </a:rPr>
-              <a:t>be Predicted from Neural Architecture</a:t>
+              <a:t>from Neural Architecture</a:t>
             </a:r>
             <a:endParaRPr lang="en-US" sz="4800" dirty="0">
               <a:latin typeface="Gill Sans MT" pitchFamily="34" charset="0"/>
@@ -3674,13 +3653,6 @@
           </a:p>
           <a:p>
             <a:pPr algn="ctr"/>
-            <a:endParaRPr lang="en-US" sz="4800" dirty="0">
-              <a:latin typeface="Gill Sans MT" pitchFamily="34" charset="0"/>
-              <a:cs typeface="Microsoft Sans Serif" pitchFamily="34" charset="0"/>
-            </a:endParaRPr>
-          </a:p>
-          <a:p>
-            <a:pPr algn="ctr"/>
             <a:endParaRPr lang="en-US" sz="4800" dirty="0" smtClean="0">
               <a:latin typeface="Gill Sans MT" pitchFamily="34" charset="0"/>
               <a:cs typeface="Microsoft Sans Serif" pitchFamily="34" charset="0"/>
@@ -4054,6 +4026,42 @@
           <a:lstStyle/>
           <a:p>
             <a:endParaRPr lang="en-US">
+              <a:latin typeface="Gill Sans MT" pitchFamily="34" charset="0"/>
+              <a:cs typeface="Microsoft Sans Serif" pitchFamily="34" charset="0"/>
+            </a:endParaRPr>
+          </a:p>
+        </p:txBody>
+      </p:sp>
+      <p:sp>
+        <p:nvSpPr>
+          <p:cNvPr id="39" name="TextBox 38"/>
+          <p:cNvSpPr txBox="1"/>
+          <p:nvPr/>
+        </p:nvSpPr>
+        <p:spPr>
+          <a:xfrm>
+            <a:off x="27602711" y="5538880"/>
+            <a:ext cx="8097858" cy="1323439"/>
+          </a:xfrm>
+          <a:prstGeom prst="rect">
+            <a:avLst/>
+          </a:prstGeom>
+          <a:noFill/>
+        </p:spPr>
+        <p:txBody>
+          <a:bodyPr wrap="none" rtlCol="0">
+            <a:spAutoFit/>
+          </a:bodyPr>
+          <a:lstStyle/>
+          <a:p>
+            <a:r>
+              <a:rPr lang="en-US" dirty="0" smtClean="0">
+                <a:latin typeface="Gill Sans MT" pitchFamily="34" charset="0"/>
+                <a:cs typeface="Microsoft Sans Serif" pitchFamily="34" charset="0"/>
+              </a:rPr>
+              <a:t>Model of Behavior</a:t>
+            </a:r>
+            <a:endParaRPr lang="en-US" dirty="0">
               <a:latin typeface="Gill Sans MT" pitchFamily="34" charset="0"/>
               <a:cs typeface="Microsoft Sans Serif" pitchFamily="34" charset="0"/>
             </a:endParaRPr>
@@ -4083,7 +4091,7 @@
         </p:blipFill>
         <p:spPr bwMode="auto">
           <a:xfrm>
-            <a:off x="1524000" y="952500"/>
+            <a:off x="1066800" y="952500"/>
             <a:ext cx="3524250" cy="3524250"/>
           </a:xfrm>
           <a:prstGeom prst="rect">
@@ -4103,49 +4111,13 @@
       </p:pic>
       <p:sp>
         <p:nvSpPr>
-          <p:cNvPr id="39" name="TextBox 38"/>
-          <p:cNvSpPr txBox="1"/>
-          <p:nvPr/>
-        </p:nvSpPr>
-        <p:spPr>
-          <a:xfrm>
-            <a:off x="27602711" y="5538880"/>
-            <a:ext cx="8097858" cy="1323439"/>
-          </a:xfrm>
-          <a:prstGeom prst="rect">
-            <a:avLst/>
-          </a:prstGeom>
-          <a:noFill/>
-        </p:spPr>
-        <p:txBody>
-          <a:bodyPr wrap="none" rtlCol="0">
-            <a:spAutoFit/>
-          </a:bodyPr>
-          <a:lstStyle/>
-          <a:p>
-            <a:r>
-              <a:rPr lang="en-US" dirty="0" smtClean="0">
-                <a:latin typeface="Gill Sans MT" pitchFamily="34" charset="0"/>
-                <a:cs typeface="Microsoft Sans Serif" pitchFamily="34" charset="0"/>
-              </a:rPr>
-              <a:t>Model of Behavior</a:t>
-            </a:r>
-            <a:endParaRPr lang="en-US" dirty="0">
-              <a:latin typeface="Gill Sans MT" pitchFamily="34" charset="0"/>
-              <a:cs typeface="Microsoft Sans Serif" pitchFamily="34" charset="0"/>
-            </a:endParaRPr>
-          </a:p>
-        </p:txBody>
-      </p:sp>
-      <p:sp>
-        <p:nvSpPr>
           <p:cNvPr id="2" name="TextBox 1"/>
           <p:cNvSpPr txBox="1"/>
           <p:nvPr/>
         </p:nvSpPr>
         <p:spPr>
           <a:xfrm>
-            <a:off x="32842200" y="1221908"/>
+            <a:off x="33604200" y="1221908"/>
             <a:ext cx="3620478" cy="2985433"/>
           </a:xfrm>
           <a:prstGeom prst="rect">
@@ -5218,8 +5190,8 @@
         </p:nvSpPr>
         <p:spPr>
           <a:xfrm>
-            <a:off x="12228309" y="22192095"/>
-            <a:ext cx="13757035" cy="6740307"/>
+            <a:off x="11865839" y="20421600"/>
+            <a:ext cx="14794700" cy="13142059"/>
           </a:xfrm>
           <a:prstGeom prst="rect">
             <a:avLst/>
@@ -5235,19 +5207,65 @@
             <a:pPr algn="just"/>
             <a:r>
               <a:rPr lang="en-US" sz="4800" dirty="0" smtClean="0"/>
-              <a:t>We observed an asymmetry in how attention to contrast and motion interact in the visual system. Data recorded from fMRI sessions suggests that attention to contrast inhibits the representation of motion in area MT, but that the reverse is not true.</a:t>
+              <a:t>We observed an asymmetry in how attention to contrast and motion interact in the visual system. Data recorded from fMRI </a:t>
+            </a:r>
+            <a:r>
+              <a:rPr lang="en-US" sz="4800" dirty="0" smtClean="0"/>
+              <a:t>suggest that </a:t>
+            </a:r>
+            <a:r>
+              <a:rPr lang="en-US" sz="4800" dirty="0" smtClean="0"/>
+              <a:t>attention to contrast inhibits the representation of </a:t>
+            </a:r>
+            <a:r>
+              <a:rPr lang="en-US" sz="4800" dirty="0" smtClean="0"/>
+              <a:t>motion, but not the reverse.</a:t>
             </a:r>
           </a:p>
           <a:p>
             <a:pPr algn="just"/>
+            <a:endParaRPr lang="en-US" sz="4800" dirty="0" smtClean="0"/>
+          </a:p>
+          <a:p>
+            <a:pPr algn="ctr"/>
+            <a:r>
+              <a:rPr lang="en-US" sz="6400" dirty="0" smtClean="0"/>
+              <a:t>Future Work</a:t>
+            </a:r>
+          </a:p>
+          <a:p>
+            <a:pPr algn="ctr"/>
+            <a:endParaRPr lang="en-US" sz="6400" dirty="0" smtClean="0"/>
+          </a:p>
+          <a:p>
+            <a:pPr algn="just"/>
+            <a:r>
+              <a:rPr lang="en-US" sz="4800" dirty="0" smtClean="0"/>
+              <a:t>We expect that this asymmetry </a:t>
+            </a:r>
+            <a:r>
+              <a:rPr lang="en-US" sz="4800" dirty="0" smtClean="0"/>
+              <a:t>exists </a:t>
+            </a:r>
+            <a:r>
+              <a:rPr lang="en-US" sz="4800" dirty="0" smtClean="0"/>
+              <a:t>for all features represented by the visual system—we plan to investigate this further for contrast, color, orientation, motion, scene gist, and faces.</a:t>
+            </a:r>
+          </a:p>
+          <a:p>
+            <a:pPr algn="ctr"/>
             <a:endParaRPr lang="en-US" sz="4800" dirty="0"/>
           </a:p>
           <a:p>
             <a:pPr algn="just"/>
             <a:r>
               <a:rPr lang="en-US" sz="4800" dirty="0" smtClean="0"/>
-              <a:t>In future work we will investigate whether this hierarchical relationship is a general feature of the visual system.</a:t>
-            </a:r>
+              <a:t>Convolutional neural networks, which share this feed-forward property, should show a similar asymmetry when they are tuned (by an “attention” mechanism) towards specific priors.</a:t>
+            </a:r>
+            <a:endParaRPr lang="en-US" sz="4800" dirty="0"/>
+          </a:p>
+          <a:p>
+            <a:pPr algn="ctr"/>
             <a:endParaRPr lang="en-US" sz="4800" dirty="0"/>
           </a:p>
         </p:txBody>

</xml_diff>